<commit_message>
Add walkthough for deployment on OS X
</commit_message>
<xml_diff>
--- a/tutorial.pptx
+++ b/tutorial.pptx
@@ -885,7 +885,7 @@
           <a:p>
             <a:fld id="{726D1E20-9ABF-F742-B190-48147E829F40}" type="datetimeFigureOut">
               <a:rPr lang="en-US" smtClean="0"/>
-              <a:t>11/22/16</a:t>
+              <a:t>11/28/16</a:t>
             </a:fld>
             <a:endParaRPr lang="en-US"/>
           </a:p>
@@ -1141,7 +1141,7 @@
           <a:p>
             <a:fld id="{726D1E20-9ABF-F742-B190-48147E829F40}" type="datetimeFigureOut">
               <a:rPr lang="en-US" smtClean="0"/>
-              <a:t>11/22/16</a:t>
+              <a:t>11/28/16</a:t>
             </a:fld>
             <a:endParaRPr lang="en-US"/>
           </a:p>
@@ -1455,7 +1455,7 @@
           <a:p>
             <a:fld id="{726D1E20-9ABF-F742-B190-48147E829F40}" type="datetimeFigureOut">
               <a:rPr lang="en-US" smtClean="0"/>
-              <a:t>11/22/16</a:t>
+              <a:t>11/28/16</a:t>
             </a:fld>
             <a:endParaRPr lang="en-US"/>
           </a:p>
@@ -1788,7 +1788,7 @@
           <a:p>
             <a:fld id="{726D1E20-9ABF-F742-B190-48147E829F40}" type="datetimeFigureOut">
               <a:rPr lang="en-US" smtClean="0"/>
-              <a:t>11/22/16</a:t>
+              <a:t>11/28/16</a:t>
             </a:fld>
             <a:endParaRPr lang="en-US"/>
           </a:p>
@@ -2102,7 +2102,7 @@
           <a:p>
             <a:fld id="{726D1E20-9ABF-F742-B190-48147E829F40}" type="datetimeFigureOut">
               <a:rPr lang="en-US" smtClean="0"/>
-              <a:t>11/22/16</a:t>
+              <a:t>11/28/16</a:t>
             </a:fld>
             <a:endParaRPr lang="en-US"/>
           </a:p>
@@ -2495,7 +2495,7 @@
           <a:p>
             <a:fld id="{726D1E20-9ABF-F742-B190-48147E829F40}" type="datetimeFigureOut">
               <a:rPr lang="en-US" smtClean="0"/>
-              <a:t>11/22/16</a:t>
+              <a:t>11/28/16</a:t>
             </a:fld>
             <a:endParaRPr lang="en-US"/>
           </a:p>
@@ -2665,7 +2665,7 @@
           <a:p>
             <a:fld id="{726D1E20-9ABF-F742-B190-48147E829F40}" type="datetimeFigureOut">
               <a:rPr lang="en-US" smtClean="0"/>
-              <a:t>11/22/16</a:t>
+              <a:t>11/28/16</a:t>
             </a:fld>
             <a:endParaRPr lang="en-US"/>
           </a:p>
@@ -2845,7 +2845,7 @@
           <a:p>
             <a:fld id="{726D1E20-9ABF-F742-B190-48147E829F40}" type="datetimeFigureOut">
               <a:rPr lang="en-US" smtClean="0"/>
-              <a:t>11/22/16</a:t>
+              <a:t>11/28/16</a:t>
             </a:fld>
             <a:endParaRPr lang="en-US"/>
           </a:p>
@@ -3015,7 +3015,7 @@
           <a:p>
             <a:fld id="{726D1E20-9ABF-F742-B190-48147E829F40}" type="datetimeFigureOut">
               <a:rPr lang="en-US" smtClean="0"/>
-              <a:t>11/22/16</a:t>
+              <a:t>11/28/16</a:t>
             </a:fld>
             <a:endParaRPr lang="en-US"/>
           </a:p>
@@ -3262,7 +3262,7 @@
           <a:p>
             <a:fld id="{726D1E20-9ABF-F742-B190-48147E829F40}" type="datetimeFigureOut">
               <a:rPr lang="en-US" smtClean="0"/>
-              <a:t>11/22/16</a:t>
+              <a:t>11/28/16</a:t>
             </a:fld>
             <a:endParaRPr lang="en-US"/>
           </a:p>
@@ -3494,7 +3494,7 @@
           <a:p>
             <a:fld id="{726D1E20-9ABF-F742-B190-48147E829F40}" type="datetimeFigureOut">
               <a:rPr lang="en-US" smtClean="0"/>
-              <a:t>11/22/16</a:t>
+              <a:t>11/28/16</a:t>
             </a:fld>
             <a:endParaRPr lang="en-US"/>
           </a:p>
@@ -3868,7 +3868,7 @@
           <a:p>
             <a:fld id="{726D1E20-9ABF-F742-B190-48147E829F40}" type="datetimeFigureOut">
               <a:rPr lang="en-US" smtClean="0"/>
-              <a:t>11/22/16</a:t>
+              <a:t>11/28/16</a:t>
             </a:fld>
             <a:endParaRPr lang="en-US"/>
           </a:p>
@@ -3991,7 +3991,7 @@
           <a:p>
             <a:fld id="{726D1E20-9ABF-F742-B190-48147E829F40}" type="datetimeFigureOut">
               <a:rPr lang="en-US" smtClean="0"/>
-              <a:t>11/22/16</a:t>
+              <a:t>11/28/16</a:t>
             </a:fld>
             <a:endParaRPr lang="en-US"/>
           </a:p>
@@ -4086,7 +4086,7 @@
           <a:p>
             <a:fld id="{726D1E20-9ABF-F742-B190-48147E829F40}" type="datetimeFigureOut">
               <a:rPr lang="en-US" smtClean="0"/>
-              <a:t>11/22/16</a:t>
+              <a:t>11/28/16</a:t>
             </a:fld>
             <a:endParaRPr lang="en-US"/>
           </a:p>
@@ -4346,7 +4346,7 @@
           <a:p>
             <a:fld id="{726D1E20-9ABF-F742-B190-48147E829F40}" type="datetimeFigureOut">
               <a:rPr lang="en-US" smtClean="0"/>
-              <a:t>11/22/16</a:t>
+              <a:t>11/28/16</a:t>
             </a:fld>
             <a:endParaRPr lang="en-US"/>
           </a:p>
@@ -4656,7 +4656,7 @@
           <a:p>
             <a:fld id="{726D1E20-9ABF-F742-B190-48147E829F40}" type="datetimeFigureOut">
               <a:rPr lang="en-US" smtClean="0"/>
-              <a:t>11/22/16</a:t>
+              <a:t>11/28/16</a:t>
             </a:fld>
             <a:endParaRPr lang="en-US"/>
           </a:p>
@@ -5358,7 +5358,7 @@
           <a:p>
             <a:fld id="{726D1E20-9ABF-F742-B190-48147E829F40}" type="datetimeFigureOut">
               <a:rPr lang="en-US" smtClean="0"/>
-              <a:t>11/22/16</a:t>
+              <a:t>11/28/16</a:t>
             </a:fld>
             <a:endParaRPr lang="en-US"/>
           </a:p>
@@ -5926,8 +5926,16 @@
           <a:lstStyle/>
           <a:p>
             <a:r>
+              <a:rPr lang="en-US" smtClean="0"/>
+              <a:t>November </a:t>
+            </a:r>
+            <a:r>
+              <a:rPr lang="en-US" smtClean="0"/>
+              <a:t>28, </a:t>
+            </a:r>
+            <a:r>
               <a:rPr lang="en-US" dirty="0" smtClean="0"/>
-              <a:t>November 22, 2016</a:t>
+              <a:t>2016</a:t>
             </a:r>
             <a:endParaRPr lang="en-US" dirty="0"/>
           </a:p>
@@ -6435,13 +6443,8 @@
           <a:p>
             <a:r>
               <a:rPr lang="en-US" sz="2000" dirty="0" smtClean="0"/>
-              <a:t>Services are responsible for further routing queries to other </a:t>
-            </a:r>
-            <a:r>
-              <a:rPr lang="en-US" sz="2000" dirty="0" smtClean="0"/>
-              <a:t>services.</a:t>
-            </a:r>
-            <a:endParaRPr lang="en-US" sz="2000" dirty="0" smtClean="0"/>
+              <a:t>Services are responsible for further routing queries to other services.</a:t>
+            </a:r>
           </a:p>
           <a:p>
             <a:r>
@@ -10834,7 +10837,7 @@
         </p:nvSpPr>
         <p:spPr>
           <a:xfrm>
-            <a:off x="2286546" y="996803"/>
+            <a:off x="2657602" y="996803"/>
             <a:ext cx="6527253" cy="2158173"/>
           </a:xfrm>
           <a:prstGeom prst="cloud">
@@ -10872,8 +10875,8 @@
         </p:nvSpPr>
         <p:spPr>
           <a:xfrm>
-            <a:off x="8307791" y="4563637"/>
-            <a:ext cx="3392091" cy="2171846"/>
+            <a:off x="393830" y="3310068"/>
+            <a:ext cx="2124808" cy="1369975"/>
           </a:xfrm>
           <a:prstGeom prst="cloud">
             <a:avLst/>
@@ -10910,7 +10913,7 @@
         </p:nvSpPr>
         <p:spPr>
           <a:xfrm>
-            <a:off x="6836364" y="3352002"/>
+            <a:off x="7207420" y="3352002"/>
             <a:ext cx="2130308" cy="1256068"/>
           </a:xfrm>
           <a:prstGeom prst="cloud">
@@ -10948,7 +10951,7 @@
         </p:nvSpPr>
         <p:spPr>
           <a:xfrm>
-            <a:off x="4611729" y="3340363"/>
+            <a:off x="4982785" y="3340363"/>
             <a:ext cx="2130308" cy="1256068"/>
           </a:xfrm>
           <a:prstGeom prst="cloud">
@@ -10986,7 +10989,7 @@
         </p:nvSpPr>
         <p:spPr>
           <a:xfrm>
-            <a:off x="2387094" y="3307569"/>
+            <a:off x="2758150" y="3307569"/>
             <a:ext cx="2130308" cy="1256068"/>
           </a:xfrm>
           <a:prstGeom prst="cloud">
@@ -11024,7 +11027,7 @@
         </p:nvSpPr>
         <p:spPr>
           <a:xfrm>
-            <a:off x="4611729" y="5347749"/>
+            <a:off x="9432055" y="3352442"/>
             <a:ext cx="2130308" cy="1256068"/>
           </a:xfrm>
           <a:prstGeom prst="cloud">
@@ -11033,13 +11036,13 @@
         </p:spPr>
         <p:style>
           <a:lnRef idx="1">
-            <a:schemeClr val="dk1"/>
+            <a:schemeClr val="accent1"/>
           </a:lnRef>
           <a:fillRef idx="2">
-            <a:schemeClr val="dk1"/>
+            <a:schemeClr val="accent1"/>
           </a:fillRef>
           <a:effectRef idx="1">
-            <a:schemeClr val="dk1"/>
+            <a:schemeClr val="accent1"/>
           </a:effectRef>
           <a:fontRef idx="minor">
             <a:schemeClr val="dk1"/>
@@ -11062,7 +11065,7 @@
         </p:nvSpPr>
         <p:spPr>
           <a:xfrm>
-            <a:off x="127000" y="4678082"/>
+            <a:off x="498056" y="4678082"/>
             <a:ext cx="3392091" cy="2057400"/>
           </a:xfrm>
           <a:prstGeom prst="cloud">
@@ -11100,7 +11103,7 @@
         </p:nvSpPr>
         <p:spPr>
           <a:xfrm>
-            <a:off x="3744377" y="129807"/>
+            <a:off x="4115433" y="129807"/>
             <a:ext cx="3740780" cy="585285"/>
           </a:xfrm>
           <a:prstGeom prst="rect">
@@ -11149,7 +11152,7 @@
         </p:nvSpPr>
         <p:spPr>
           <a:xfrm>
-            <a:off x="2746660" y="1217419"/>
+            <a:off x="3117716" y="1217419"/>
             <a:ext cx="5722807" cy="1793972"/>
           </a:xfrm>
           <a:prstGeom prst="rect">
@@ -11198,7 +11201,7 @@
         </p:nvSpPr>
         <p:spPr>
           <a:xfrm>
-            <a:off x="4315671" y="2502447"/>
+            <a:off x="4686727" y="2502447"/>
             <a:ext cx="2570922" cy="254615"/>
           </a:xfrm>
           <a:prstGeom prst="rect">
@@ -11240,7 +11243,7 @@
         </p:nvSpPr>
         <p:spPr>
           <a:xfrm>
-            <a:off x="2691585" y="3556225"/>
+            <a:off x="3062641" y="3556225"/>
             <a:ext cx="1477618" cy="675861"/>
           </a:xfrm>
           <a:prstGeom prst="rect">
@@ -11282,7 +11285,7 @@
         </p:nvSpPr>
         <p:spPr>
           <a:xfrm>
-            <a:off x="4864715" y="3575353"/>
+            <a:off x="5235771" y="3575353"/>
             <a:ext cx="1477618" cy="675861"/>
           </a:xfrm>
           <a:prstGeom prst="rect">
@@ -11324,7 +11327,7 @@
         </p:nvSpPr>
         <p:spPr>
           <a:xfrm>
-            <a:off x="7065007" y="3575352"/>
+            <a:off x="7436063" y="3575352"/>
             <a:ext cx="1477618" cy="675861"/>
           </a:xfrm>
           <a:prstGeom prst="rect">
@@ -11366,7 +11369,7 @@
         </p:nvSpPr>
         <p:spPr>
           <a:xfrm>
-            <a:off x="774446" y="5089892"/>
+            <a:off x="1145502" y="5089892"/>
             <a:ext cx="2159515" cy="1150852"/>
           </a:xfrm>
           <a:prstGeom prst="can">
@@ -11416,7 +11419,7 @@
         </p:nvCxnSpPr>
         <p:spPr>
           <a:xfrm>
-            <a:off x="5486397" y="746000"/>
+            <a:off x="5857453" y="746000"/>
             <a:ext cx="0" cy="476938"/>
           </a:xfrm>
           <a:prstGeom prst="straightConnector1">
@@ -11449,8 +11452,8 @@
         </p:nvSpPr>
         <p:spPr>
           <a:xfrm>
-            <a:off x="9222764" y="4813118"/>
-            <a:ext cx="1562146" cy="1704400"/>
+            <a:off x="661293" y="3555297"/>
+            <a:ext cx="1642461" cy="773448"/>
           </a:xfrm>
           <a:prstGeom prst="rect">
             <a:avLst/>
@@ -11505,7 +11508,7 @@
         </p:nvSpPr>
         <p:spPr>
           <a:xfrm>
-            <a:off x="4315671" y="1550718"/>
+            <a:off x="4686727" y="1550718"/>
             <a:ext cx="2570922" cy="254615"/>
           </a:xfrm>
           <a:prstGeom prst="rect">
@@ -11547,7 +11550,7 @@
         </p:nvCxnSpPr>
         <p:spPr>
           <a:xfrm flipV="1">
-            <a:off x="3503088" y="3009542"/>
+            <a:off x="3874144" y="3009542"/>
             <a:ext cx="463259" cy="523386"/>
           </a:xfrm>
           <a:prstGeom prst="straightConnector1">
@@ -11580,7 +11583,7 @@
         </p:nvSpPr>
         <p:spPr>
           <a:xfrm>
-            <a:off x="4938074" y="5637853"/>
+            <a:off x="9758400" y="3642546"/>
             <a:ext cx="1477618" cy="675861"/>
           </a:xfrm>
           <a:prstGeom prst="rect">
@@ -11622,7 +11625,7 @@
         </p:nvCxnSpPr>
         <p:spPr>
           <a:xfrm flipH="1">
-            <a:off x="5486397" y="3030518"/>
+            <a:off x="5857453" y="3030518"/>
             <a:ext cx="8792" cy="525707"/>
           </a:xfrm>
           <a:prstGeom prst="straightConnector1">
@@ -11655,7 +11658,7 @@
         </p:nvCxnSpPr>
         <p:spPr>
           <a:xfrm flipV="1">
-            <a:off x="5762222" y="3006261"/>
+            <a:off x="6133278" y="3006261"/>
             <a:ext cx="466" cy="518247"/>
           </a:xfrm>
           <a:prstGeom prst="straightConnector1">
@@ -11688,7 +11691,7 @@
         </p:nvCxnSpPr>
         <p:spPr>
           <a:xfrm flipV="1">
-            <a:off x="5762222" y="715092"/>
+            <a:off x="6133278" y="715092"/>
             <a:ext cx="0" cy="502328"/>
           </a:xfrm>
           <a:prstGeom prst="straightConnector1">
@@ -11721,7 +11724,7 @@
         </p:nvSpPr>
         <p:spPr>
           <a:xfrm>
-            <a:off x="2916268" y="1801925"/>
+            <a:off x="3287324" y="1801925"/>
             <a:ext cx="1205647" cy="571858"/>
           </a:xfrm>
           <a:prstGeom prst="rect">
@@ -11763,7 +11766,7 @@
         </p:nvSpPr>
         <p:spPr>
           <a:xfrm>
-            <a:off x="7080348" y="1797986"/>
+            <a:off x="7451404" y="1797986"/>
             <a:ext cx="1205647" cy="571858"/>
           </a:xfrm>
           <a:prstGeom prst="rect">
@@ -11805,7 +11808,7 @@
         </p:nvCxnSpPr>
         <p:spPr>
           <a:xfrm flipH="1">
-            <a:off x="3170610" y="3021734"/>
+            <a:off x="3541666" y="3021734"/>
             <a:ext cx="496792" cy="537117"/>
           </a:xfrm>
           <a:prstGeom prst="straightConnector1">
@@ -11838,7 +11841,7 @@
         </p:nvSpPr>
         <p:spPr>
           <a:xfrm>
-            <a:off x="4798388" y="746924"/>
+            <a:off x="5169444" y="746924"/>
             <a:ext cx="688009" cy="369332"/>
           </a:xfrm>
           <a:prstGeom prst="rect">
@@ -11868,7 +11871,7 @@
         </p:nvSpPr>
         <p:spPr>
           <a:xfrm>
-            <a:off x="4138658" y="3088526"/>
+            <a:off x="4509714" y="3088526"/>
             <a:ext cx="1378134" cy="369332"/>
           </a:xfrm>
           <a:prstGeom prst="rect">
@@ -11898,7 +11901,7 @@
         </p:nvCxnSpPr>
         <p:spPr>
           <a:xfrm rot="16200000" flipH="1">
-            <a:off x="5592551" y="2416353"/>
+            <a:off x="5963607" y="2416353"/>
             <a:ext cx="44433" cy="4449270"/>
           </a:xfrm>
           <a:prstGeom prst="curvedConnector3">
@@ -11933,7 +11936,7 @@
         </p:nvCxnSpPr>
         <p:spPr>
           <a:xfrm rot="5400000" flipH="1">
-            <a:off x="5549935" y="2624066"/>
+            <a:off x="5920991" y="2624066"/>
             <a:ext cx="32794" cy="3643911"/>
           </a:xfrm>
           <a:prstGeom prst="curvedConnector3">
@@ -11968,7 +11971,7 @@
         </p:nvSpPr>
         <p:spPr>
           <a:xfrm>
-            <a:off x="4906079" y="4880348"/>
+            <a:off x="5277135" y="4880348"/>
             <a:ext cx="1417376" cy="369332"/>
           </a:xfrm>
           <a:prstGeom prst="rect">
@@ -12000,7 +12003,7 @@
         </p:nvCxnSpPr>
         <p:spPr>
           <a:xfrm flipH="1">
-            <a:off x="1713125" y="3894156"/>
+            <a:off x="2084181" y="3894156"/>
             <a:ext cx="978460" cy="1142438"/>
           </a:xfrm>
           <a:prstGeom prst="straightConnector1">
@@ -12033,7 +12036,7 @@
         </p:nvCxnSpPr>
         <p:spPr>
           <a:xfrm flipV="1">
-            <a:off x="2114455" y="4233167"/>
+            <a:off x="2485511" y="4233167"/>
             <a:ext cx="685873" cy="796678"/>
           </a:xfrm>
           <a:prstGeom prst="straightConnector1">
@@ -12066,7 +12069,7 @@
         </p:nvSpPr>
         <p:spPr>
           <a:xfrm>
-            <a:off x="1571370" y="4186382"/>
+            <a:off x="2923324" y="4410488"/>
             <a:ext cx="585417" cy="369332"/>
           </a:xfrm>
           <a:prstGeom prst="rect">
@@ -12096,7 +12099,7 @@
         </p:nvSpPr>
         <p:spPr>
           <a:xfrm>
-            <a:off x="2034375" y="3030086"/>
+            <a:off x="2405431" y="3030086"/>
             <a:ext cx="1417376" cy="369332"/>
           </a:xfrm>
           <a:prstGeom prst="rect">
@@ -12115,6 +12118,354 @@
               <a:t>RPC (Thrift)</a:t>
             </a:r>
             <a:endParaRPr lang="en-US" dirty="0"/>
+          </a:p>
+        </p:txBody>
+      </p:sp>
+      <p:sp>
+        <p:nvSpPr>
+          <p:cNvPr id="39" name="Cloud 38"/>
+          <p:cNvSpPr/>
+          <p:nvPr/>
+        </p:nvSpPr>
+        <p:spPr>
+          <a:xfrm>
+            <a:off x="4051841" y="5355670"/>
+            <a:ext cx="2130308" cy="1256068"/>
+          </a:xfrm>
+          <a:prstGeom prst="cloud">
+            <a:avLst/>
+          </a:prstGeom>
+        </p:spPr>
+        <p:style>
+          <a:lnRef idx="1">
+            <a:schemeClr val="accent1"/>
+          </a:lnRef>
+          <a:fillRef idx="2">
+            <a:schemeClr val="accent1"/>
+          </a:fillRef>
+          <a:effectRef idx="1">
+            <a:schemeClr val="accent1"/>
+          </a:effectRef>
+          <a:fontRef idx="minor">
+            <a:schemeClr val="dk1"/>
+          </a:fontRef>
+        </p:style>
+        <p:txBody>
+          <a:bodyPr rtlCol="0" anchor="ctr"/>
+          <a:lstStyle/>
+          <a:p>
+            <a:pPr algn="ctr"/>
+            <a:endParaRPr lang="en-US"/>
+          </a:p>
+        </p:txBody>
+      </p:sp>
+      <p:sp>
+        <p:nvSpPr>
+          <p:cNvPr id="40" name="Rectangle 39"/>
+          <p:cNvSpPr/>
+          <p:nvPr/>
+        </p:nvSpPr>
+        <p:spPr>
+          <a:xfrm>
+            <a:off x="4280484" y="5579020"/>
+            <a:ext cx="1477618" cy="675861"/>
+          </a:xfrm>
+          <a:prstGeom prst="rect">
+            <a:avLst/>
+          </a:prstGeom>
+        </p:spPr>
+        <p:style>
+          <a:lnRef idx="0">
+            <a:schemeClr val="accent3"/>
+          </a:lnRef>
+          <a:fillRef idx="3">
+            <a:schemeClr val="accent3"/>
+          </a:fillRef>
+          <a:effectRef idx="3">
+            <a:schemeClr val="accent3"/>
+          </a:effectRef>
+          <a:fontRef idx="minor">
+            <a:schemeClr val="lt1"/>
+          </a:fontRef>
+        </p:style>
+        <p:txBody>
+          <a:bodyPr rtlCol="0" anchor="ctr"/>
+          <a:lstStyle/>
+          <a:p>
+            <a:pPr algn="ctr"/>
+            <a:r>
+              <a:rPr lang="en-US" dirty="0" smtClean="0"/>
+              <a:t>FACE (C++)</a:t>
+            </a:r>
+            <a:endParaRPr lang="en-US" dirty="0"/>
+          </a:p>
+        </p:txBody>
+      </p:sp>
+      <p:sp>
+        <p:nvSpPr>
+          <p:cNvPr id="41" name="Cloud 40"/>
+          <p:cNvSpPr/>
+          <p:nvPr/>
+        </p:nvSpPr>
+        <p:spPr>
+          <a:xfrm>
+            <a:off x="6324603" y="5355670"/>
+            <a:ext cx="2130308" cy="1256068"/>
+          </a:xfrm>
+          <a:prstGeom prst="cloud">
+            <a:avLst/>
+          </a:prstGeom>
+        </p:spPr>
+        <p:style>
+          <a:lnRef idx="1">
+            <a:schemeClr val="accent6"/>
+          </a:lnRef>
+          <a:fillRef idx="2">
+            <a:schemeClr val="accent6"/>
+          </a:fillRef>
+          <a:effectRef idx="1">
+            <a:schemeClr val="accent6"/>
+          </a:effectRef>
+          <a:fontRef idx="minor">
+            <a:schemeClr val="dk1"/>
+          </a:fontRef>
+        </p:style>
+        <p:txBody>
+          <a:bodyPr rtlCol="0" anchor="ctr"/>
+          <a:lstStyle/>
+          <a:p>
+            <a:pPr algn="ctr"/>
+            <a:endParaRPr lang="en-US"/>
+          </a:p>
+        </p:txBody>
+      </p:sp>
+      <p:sp>
+        <p:nvSpPr>
+          <p:cNvPr id="42" name="Rectangle 41"/>
+          <p:cNvSpPr/>
+          <p:nvPr/>
+        </p:nvSpPr>
+        <p:spPr>
+          <a:xfrm>
+            <a:off x="6553246" y="5579020"/>
+            <a:ext cx="1477618" cy="675861"/>
+          </a:xfrm>
+          <a:prstGeom prst="rect">
+            <a:avLst/>
+          </a:prstGeom>
+        </p:spPr>
+        <p:style>
+          <a:lnRef idx="0">
+            <a:schemeClr val="accent3"/>
+          </a:lnRef>
+          <a:fillRef idx="3">
+            <a:schemeClr val="accent3"/>
+          </a:fillRef>
+          <a:effectRef idx="3">
+            <a:schemeClr val="accent3"/>
+          </a:effectRef>
+          <a:fontRef idx="minor">
+            <a:schemeClr val="lt1"/>
+          </a:fontRef>
+        </p:style>
+        <p:txBody>
+          <a:bodyPr rtlCol="0" anchor="ctr"/>
+          <a:lstStyle/>
+          <a:p>
+            <a:pPr algn="ctr"/>
+            <a:r>
+              <a:rPr lang="en-US" dirty="0" smtClean="0"/>
+              <a:t>DIG (C++)</a:t>
+            </a:r>
+            <a:endParaRPr lang="en-US" dirty="0"/>
+          </a:p>
+        </p:txBody>
+      </p:sp>
+      <p:sp>
+        <p:nvSpPr>
+          <p:cNvPr id="43" name="Cloud 42"/>
+          <p:cNvSpPr/>
+          <p:nvPr/>
+        </p:nvSpPr>
+        <p:spPr>
+          <a:xfrm>
+            <a:off x="8590751" y="5355670"/>
+            <a:ext cx="2130308" cy="1256068"/>
+          </a:xfrm>
+          <a:prstGeom prst="cloud">
+            <a:avLst/>
+          </a:prstGeom>
+        </p:spPr>
+        <p:style>
+          <a:lnRef idx="1">
+            <a:schemeClr val="accent2"/>
+          </a:lnRef>
+          <a:fillRef idx="2">
+            <a:schemeClr val="accent2"/>
+          </a:fillRef>
+          <a:effectRef idx="1">
+            <a:schemeClr val="accent2"/>
+          </a:effectRef>
+          <a:fontRef idx="minor">
+            <a:schemeClr val="dk1"/>
+          </a:fontRef>
+        </p:style>
+        <p:txBody>
+          <a:bodyPr rtlCol="0" anchor="ctr"/>
+          <a:lstStyle/>
+          <a:p>
+            <a:pPr algn="ctr"/>
+            <a:endParaRPr lang="en-US"/>
+          </a:p>
+        </p:txBody>
+      </p:sp>
+      <p:sp>
+        <p:nvSpPr>
+          <p:cNvPr id="44" name="Rectangle 43"/>
+          <p:cNvSpPr/>
+          <p:nvPr/>
+        </p:nvSpPr>
+        <p:spPr>
+          <a:xfrm>
+            <a:off x="8819394" y="5579020"/>
+            <a:ext cx="1477618" cy="675861"/>
+          </a:xfrm>
+          <a:prstGeom prst="rect">
+            <a:avLst/>
+          </a:prstGeom>
+        </p:spPr>
+        <p:style>
+          <a:lnRef idx="0">
+            <a:schemeClr val="accent3"/>
+          </a:lnRef>
+          <a:fillRef idx="3">
+            <a:schemeClr val="accent3"/>
+          </a:fillRef>
+          <a:effectRef idx="3">
+            <a:schemeClr val="accent3"/>
+          </a:effectRef>
+          <a:fontRef idx="minor">
+            <a:schemeClr val="lt1"/>
+          </a:fontRef>
+        </p:style>
+        <p:txBody>
+          <a:bodyPr rtlCol="0" anchor="ctr"/>
+          <a:lstStyle/>
+          <a:p>
+            <a:pPr algn="ctr"/>
+            <a:r>
+              <a:rPr lang="en-US" dirty="0" smtClean="0"/>
+              <a:t>IMC (C++)</a:t>
+            </a:r>
+            <a:endParaRPr lang="en-US" dirty="0"/>
+          </a:p>
+        </p:txBody>
+      </p:sp>
+      <p:sp>
+        <p:nvSpPr>
+          <p:cNvPr id="2" name="Rectangle 1"/>
+          <p:cNvSpPr/>
+          <p:nvPr/>
+        </p:nvSpPr>
+        <p:spPr>
+          <a:xfrm>
+            <a:off x="4051841" y="5209727"/>
+            <a:ext cx="6688890" cy="1657307"/>
+          </a:xfrm>
+          <a:prstGeom prst="rect">
+            <a:avLst/>
+          </a:prstGeom>
+          <a:solidFill>
+            <a:schemeClr val="accent1">
+              <a:alpha val="10000"/>
+            </a:schemeClr>
+          </a:solidFill>
+          <a:ln>
+            <a:noFill/>
+          </a:ln>
+        </p:spPr>
+        <p:style>
+          <a:lnRef idx="2">
+            <a:schemeClr val="accent1">
+              <a:shade val="50000"/>
+            </a:schemeClr>
+          </a:lnRef>
+          <a:fillRef idx="1">
+            <a:schemeClr val="accent1"/>
+          </a:fillRef>
+          <a:effectRef idx="0">
+            <a:schemeClr val="accent1"/>
+          </a:effectRef>
+          <a:fontRef idx="minor">
+            <a:schemeClr val="lt1"/>
+          </a:fontRef>
+        </p:style>
+        <p:txBody>
+          <a:bodyPr rtlCol="0" anchor="ctr"/>
+          <a:lstStyle/>
+          <a:p>
+            <a:pPr algn="ctr"/>
+            <a:endParaRPr lang="en-US" dirty="0" smtClean="0">
+              <a:solidFill>
+                <a:schemeClr val="accent1"/>
+              </a:solidFill>
+            </a:endParaRPr>
+          </a:p>
+          <a:p>
+            <a:pPr algn="ctr"/>
+            <a:endParaRPr lang="en-US" dirty="0">
+              <a:solidFill>
+                <a:schemeClr val="accent1"/>
+              </a:solidFill>
+            </a:endParaRPr>
+          </a:p>
+          <a:p>
+            <a:pPr algn="ctr"/>
+            <a:endParaRPr lang="en-US" dirty="0" smtClean="0">
+              <a:solidFill>
+                <a:schemeClr val="accent1"/>
+              </a:solidFill>
+            </a:endParaRPr>
+          </a:p>
+          <a:p>
+            <a:pPr algn="ctr"/>
+            <a:endParaRPr lang="en-US" dirty="0">
+              <a:solidFill>
+                <a:schemeClr val="accent1"/>
+              </a:solidFill>
+            </a:endParaRPr>
+          </a:p>
+          <a:p>
+            <a:pPr algn="ctr"/>
+            <a:endParaRPr lang="en-US" dirty="0" smtClean="0">
+              <a:solidFill>
+                <a:schemeClr val="accent1"/>
+              </a:solidFill>
+            </a:endParaRPr>
+          </a:p>
+          <a:p>
+            <a:pPr algn="ctr"/>
+            <a:r>
+              <a:rPr lang="en-US" smtClean="0">
+                <a:solidFill>
+                  <a:srgbClr val="002060"/>
+                </a:solidFill>
+              </a:rPr>
+              <a:t>DjiNN </a:t>
+            </a:r>
+            <a:r>
+              <a:rPr lang="en-US" dirty="0" smtClean="0">
+                <a:solidFill>
+                  <a:srgbClr val="002060"/>
+                </a:solidFill>
+              </a:rPr>
+              <a:t>and Tonic Suite</a:t>
+            </a:r>
+            <a:endParaRPr lang="en-US" dirty="0">
+              <a:solidFill>
+                <a:srgbClr val="002060"/>
+              </a:solidFill>
+            </a:endParaRPr>
           </a:p>
         </p:txBody>
       </p:sp>
@@ -12233,13 +12584,8 @@
             </a:r>
             <a:r>
               <a:rPr lang="en-US" sz="2000" dirty="0" smtClean="0"/>
-              <a:t>: </a:t>
-            </a:r>
-            <a:r>
-              <a:rPr lang="en-US" sz="2000" dirty="0" smtClean="0"/>
-              <a:t>Stores and retrieves from the database component;</a:t>
-            </a:r>
-            <a:endParaRPr lang="en-US" sz="2000" dirty="0" smtClean="0"/>
+              <a:t>: Stores and retrieves from the database component;</a:t>
+            </a:r>
           </a:p>
           <a:p>
             <a:pPr lvl="1"/>
@@ -12261,13 +12607,8 @@
             </a:r>
             <a:r>
               <a:rPr lang="en-US" sz="2000" dirty="0" smtClean="0"/>
-              <a:t>caching </a:t>
-            </a:r>
-            <a:r>
-              <a:rPr lang="en-US" sz="2000" dirty="0" smtClean="0"/>
-              <a:t>layer;</a:t>
-            </a:r>
-            <a:endParaRPr lang="en-US" sz="2000" dirty="0" smtClean="0"/>
+              <a:t>caching layer;</a:t>
+            </a:r>
           </a:p>
           <a:p>
             <a:pPr lvl="1"/>

</xml_diff>